<commit_message>
Bernoulli quote to slides13f
</commit_message>
<xml_diff>
--- a/restricted/slides13f.pptx
+++ b/restricted/slides13f.pptx
@@ -6,10 +6,10 @@
     <p:sldMasterId id="2147483687" r:id="rId2"/>
   </p:sldMasterIdLst>
   <p:notesMasterIdLst>
-    <p:notesMasterId r:id="rId69"/>
+    <p:notesMasterId r:id="rId70"/>
   </p:notesMasterIdLst>
   <p:handoutMasterIdLst>
-    <p:handoutMasterId r:id="rId70"/>
+    <p:handoutMasterId r:id="rId71"/>
   </p:handoutMasterIdLst>
   <p:sldIdLst>
     <p:sldId id="764" r:id="rId3"/>
@@ -69,49 +69,50 @@
     <p:sldId id="808" r:id="rId57"/>
     <p:sldId id="823" r:id="rId58"/>
     <p:sldId id="817" r:id="rId59"/>
-    <p:sldId id="822" r:id="rId60"/>
-    <p:sldId id="809" r:id="rId61"/>
-    <p:sldId id="824" r:id="rId62"/>
-    <p:sldId id="810" r:id="rId63"/>
-    <p:sldId id="811" r:id="rId64"/>
-    <p:sldId id="812" r:id="rId65"/>
-    <p:sldId id="813" r:id="rId66"/>
-    <p:sldId id="814" r:id="rId67"/>
-    <p:sldId id="801" r:id="rId68"/>
+    <p:sldId id="848" r:id="rId60"/>
+    <p:sldId id="822" r:id="rId61"/>
+    <p:sldId id="809" r:id="rId62"/>
+    <p:sldId id="824" r:id="rId63"/>
+    <p:sldId id="810" r:id="rId64"/>
+    <p:sldId id="811" r:id="rId65"/>
+    <p:sldId id="812" r:id="rId66"/>
+    <p:sldId id="813" r:id="rId67"/>
+    <p:sldId id="814" r:id="rId68"/>
+    <p:sldId id="801" r:id="rId69"/>
   </p:sldIdLst>
   <p:sldSz cx="9144000" cy="6858000" type="screen4x3"/>
   <p:notesSz cx="7315200" cy="9601200"/>
   <p:embeddedFontLst>
     <p:embeddedFont>
       <p:font typeface="Comic Sans MS"/>
-      <p:regular r:id="rId71"/>
-      <p:bold r:id="rId72"/>
+      <p:regular r:id="rId72"/>
+      <p:bold r:id="rId73"/>
     </p:embeddedFont>
     <p:embeddedFont>
       <p:font typeface="cmsy10"/>
-      <p:regular r:id="rId73"/>
+      <p:regular r:id="rId74"/>
     </p:embeddedFont>
     <p:embeddedFont>
       <p:font typeface="Euclid Symbol" charset="2"/>
-      <p:regular r:id="rId74"/>
-      <p:bold r:id="rId75"/>
-      <p:italic r:id="rId76"/>
-      <p:boldItalic r:id="rId77"/>
+      <p:regular r:id="rId75"/>
+      <p:bold r:id="rId76"/>
+      <p:italic r:id="rId77"/>
+      <p:boldItalic r:id="rId78"/>
     </p:embeddedFont>
     <p:embeddedFont>
       <p:font typeface="Euclid"/>
-      <p:regular r:id="rId78"/>
-      <p:bold r:id="rId79"/>
-      <p:italic r:id="rId80"/>
-      <p:boldItalic r:id="rId81"/>
+      <p:regular r:id="rId79"/>
+      <p:bold r:id="rId80"/>
+      <p:italic r:id="rId81"/>
+      <p:boldItalic r:id="rId82"/>
     </p:embeddedFont>
     <p:embeddedFont>
       <p:font typeface="Arial Unicode MS"/>
-      <p:regular r:id="rId82"/>
+      <p:regular r:id="rId83"/>
     </p:embeddedFont>
   </p:embeddedFontLst>
   <p:custDataLst>
-    <p:tags r:id="rId84"/>
+    <p:tags r:id="rId85"/>
   </p:custDataLst>
   <p:defaultTextStyle>
     <a:defPPr>
@@ -5687,7 +5688,7 @@
             <a:fld id="{CE4F1C5E-EC10-4AA2-BE05-3FAD1A6DEC47}" type="slidenum">
               <a:rPr lang="en-US"/>
               <a:pPr/>
-              <a:t>58</a:t>
+              <a:t>59</a:t>
             </a:fld>
             <a:endParaRPr lang="en-US"/>
           </a:p>
@@ -5775,7 +5776,7 @@
             <a:fld id="{0E24CED3-D070-4199-ABB1-A97C5A2E2D69}" type="slidenum">
               <a:rPr lang="en-US"/>
               <a:pPr/>
-              <a:t>59</a:t>
+              <a:t>60</a:t>
             </a:fld>
             <a:endParaRPr lang="en-US"/>
           </a:p>
@@ -5863,7 +5864,7 @@
             <a:fld id="{E13B69C8-7D9E-455E-870F-C9359D47CA0D}" type="slidenum">
               <a:rPr lang="en-US"/>
               <a:pPr/>
-              <a:t>61</a:t>
+              <a:t>62</a:t>
             </a:fld>
             <a:endParaRPr lang="en-US"/>
           </a:p>
@@ -5903,7 +5904,7 @@
                 <a:latin typeface="Arial" pitchFamily="34" charset="0"/>
               </a:rPr>
               <a:pPr algn="r" defTabSz="966775"/>
-              <a:t>61</a:t>
+              <a:t>62</a:t>
             </a:fld>
             <a:endParaRPr lang="en-US" sz="1300" dirty="0">
               <a:latin typeface="Arial" pitchFamily="34" charset="0"/>
@@ -6025,7 +6026,7 @@
             <a:fld id="{C45876ED-D830-4BAD-BF23-D8FB18E18E74}" type="slidenum">
               <a:rPr lang="en-US"/>
               <a:pPr/>
-              <a:t>62</a:t>
+              <a:t>63</a:t>
             </a:fld>
             <a:endParaRPr lang="en-US"/>
           </a:p>
@@ -6113,7 +6114,7 @@
             <a:fld id="{C459CE23-AC74-4612-9505-5863346853AC}" type="slidenum">
               <a:rPr lang="en-US"/>
               <a:pPr/>
-              <a:t>63</a:t>
+              <a:t>64</a:t>
             </a:fld>
             <a:endParaRPr lang="en-US"/>
           </a:p>
@@ -6302,7 +6303,7 @@
             <a:fld id="{58D02412-0501-4BDD-893A-9335BF29F723}" type="slidenum">
               <a:rPr lang="en-US"/>
               <a:pPr/>
-              <a:t>64</a:t>
+              <a:t>65</a:t>
             </a:fld>
             <a:endParaRPr lang="en-US"/>
           </a:p>
@@ -6386,7 +6387,7 @@
             <a:fld id="{080590DD-9A9F-43DC-A51D-BBD25710B0F4}" type="slidenum">
               <a:rPr lang="en-US"/>
               <a:pPr/>
-              <a:t>65</a:t>
+              <a:t>66</a:t>
             </a:fld>
             <a:endParaRPr lang="en-US"/>
           </a:p>
@@ -6470,7 +6471,7 @@
             <a:fld id="{1B775CA1-31D6-4149-A5F4-B932B1BA8953}" type="slidenum">
               <a:rPr lang="en-US"/>
               <a:pPr/>
-              <a:t>66</a:t>
+              <a:t>67</a:t>
             </a:fld>
             <a:endParaRPr lang="en-US"/>
           </a:p>
@@ -7282,6 +7283,264 @@
 </file>
 
 <file path=ppt/slideLayouts/slideLayout6.xml><?xml version="1.0" encoding="utf-8"?>
+<p:sldLayout xmlns:a="http://schemas.openxmlformats.org/drawingml/2006/main" xmlns:r="http://schemas.openxmlformats.org/officeDocument/2006/relationships" xmlns:mc="http://schemas.openxmlformats.org/markup-compatibility/2006" xmlns:mv="urn:schemas-microsoft-com:mac:vml" xmlns:p="http://schemas.openxmlformats.org/presentationml/2006/main" mc:Ignorable="mv" mc:PreserveAttributes="mv:*" type="twoObj">
+  <p:cSld name="Two Content">
+    <p:spTree>
+      <p:nvGrpSpPr>
+        <p:cNvPr id="1" name=""/>
+        <p:cNvGrpSpPr/>
+        <p:nvPr/>
+      </p:nvGrpSpPr>
+      <p:grpSpPr>
+        <a:xfrm>
+          <a:off x="0" y="0"/>
+          <a:ext cx="0" cy="0"/>
+          <a:chOff x="0" y="0"/>
+          <a:chExt cx="0" cy="0"/>
+        </a:xfrm>
+      </p:grpSpPr>
+      <p:sp>
+        <p:nvSpPr>
+          <p:cNvPr id="2" name="Title 1"/>
+          <p:cNvSpPr>
+            <a:spLocks noGrp="1"/>
+          </p:cNvSpPr>
+          <p:nvPr>
+            <p:ph type="title"/>
+          </p:nvPr>
+        </p:nvSpPr>
+        <p:spPr/>
+        <p:txBody>
+          <a:bodyPr/>
+          <a:lstStyle/>
+          <a:p>
+            <a:r>
+              <a:rPr lang="en-US" smtClean="0"/>
+              <a:t>Click to edit Master title style</a:t>
+            </a:r>
+            <a:endParaRPr lang="en-US"/>
+          </a:p>
+        </p:txBody>
+      </p:sp>
+      <p:sp>
+        <p:nvSpPr>
+          <p:cNvPr id="3" name="Content Placeholder 2"/>
+          <p:cNvSpPr>
+            <a:spLocks noGrp="1"/>
+          </p:cNvSpPr>
+          <p:nvPr>
+            <p:ph sz="half" idx="1"/>
+          </p:nvPr>
+        </p:nvSpPr>
+        <p:spPr>
+          <a:xfrm>
+            <a:off x="685800" y="2057400"/>
+            <a:ext cx="3810000" cy="4114800"/>
+          </a:xfrm>
+        </p:spPr>
+        <p:txBody>
+          <a:bodyPr/>
+          <a:lstStyle>
+            <a:lvl1pPr>
+              <a:defRPr sz="2800"/>
+            </a:lvl1pPr>
+            <a:lvl2pPr>
+              <a:defRPr sz="2400"/>
+            </a:lvl2pPr>
+            <a:lvl3pPr>
+              <a:defRPr sz="2000"/>
+            </a:lvl3pPr>
+            <a:lvl4pPr>
+              <a:defRPr sz="1800"/>
+            </a:lvl4pPr>
+            <a:lvl5pPr>
+              <a:defRPr sz="1800"/>
+            </a:lvl5pPr>
+            <a:lvl6pPr>
+              <a:defRPr sz="1800"/>
+            </a:lvl6pPr>
+            <a:lvl7pPr>
+              <a:defRPr sz="1800"/>
+            </a:lvl7pPr>
+            <a:lvl8pPr>
+              <a:defRPr sz="1800"/>
+            </a:lvl8pPr>
+            <a:lvl9pPr>
+              <a:defRPr sz="1800"/>
+            </a:lvl9pPr>
+          </a:lstStyle>
+          <a:p>
+            <a:pPr lvl="0"/>
+            <a:r>
+              <a:rPr lang="en-US" smtClean="0"/>
+              <a:t>Click to edit Master text styles</a:t>
+            </a:r>
+          </a:p>
+          <a:p>
+            <a:pPr lvl="1"/>
+            <a:r>
+              <a:rPr lang="en-US" smtClean="0"/>
+              <a:t>Second level</a:t>
+            </a:r>
+          </a:p>
+          <a:p>
+            <a:pPr lvl="2"/>
+            <a:r>
+              <a:rPr lang="en-US" smtClean="0"/>
+              <a:t>Third level</a:t>
+            </a:r>
+          </a:p>
+          <a:p>
+            <a:pPr lvl="3"/>
+            <a:r>
+              <a:rPr lang="en-US" smtClean="0"/>
+              <a:t>Fourth level</a:t>
+            </a:r>
+          </a:p>
+          <a:p>
+            <a:pPr lvl="4"/>
+            <a:r>
+              <a:rPr lang="en-US" smtClean="0"/>
+              <a:t>Fifth level</a:t>
+            </a:r>
+            <a:endParaRPr lang="en-US"/>
+          </a:p>
+        </p:txBody>
+      </p:sp>
+      <p:sp>
+        <p:nvSpPr>
+          <p:cNvPr id="4" name="Content Placeholder 3"/>
+          <p:cNvSpPr>
+            <a:spLocks noGrp="1"/>
+          </p:cNvSpPr>
+          <p:nvPr>
+            <p:ph sz="half" idx="2"/>
+          </p:nvPr>
+        </p:nvSpPr>
+        <p:spPr>
+          <a:xfrm>
+            <a:off x="4648200" y="2057400"/>
+            <a:ext cx="3810000" cy="4114800"/>
+          </a:xfrm>
+        </p:spPr>
+        <p:txBody>
+          <a:bodyPr/>
+          <a:lstStyle>
+            <a:lvl1pPr>
+              <a:defRPr sz="2800"/>
+            </a:lvl1pPr>
+            <a:lvl2pPr>
+              <a:defRPr sz="2400"/>
+            </a:lvl2pPr>
+            <a:lvl3pPr>
+              <a:defRPr sz="2000"/>
+            </a:lvl3pPr>
+            <a:lvl4pPr>
+              <a:defRPr sz="1800"/>
+            </a:lvl4pPr>
+            <a:lvl5pPr>
+              <a:defRPr sz="1800"/>
+            </a:lvl5pPr>
+            <a:lvl6pPr>
+              <a:defRPr sz="1800"/>
+            </a:lvl6pPr>
+            <a:lvl7pPr>
+              <a:defRPr sz="1800"/>
+            </a:lvl7pPr>
+            <a:lvl8pPr>
+              <a:defRPr sz="1800"/>
+            </a:lvl8pPr>
+            <a:lvl9pPr>
+              <a:defRPr sz="1800"/>
+            </a:lvl9pPr>
+          </a:lstStyle>
+          <a:p>
+            <a:pPr lvl="0"/>
+            <a:r>
+              <a:rPr lang="en-US" smtClean="0"/>
+              <a:t>Click to edit Master text styles</a:t>
+            </a:r>
+          </a:p>
+          <a:p>
+            <a:pPr lvl="1"/>
+            <a:r>
+              <a:rPr lang="en-US" smtClean="0"/>
+              <a:t>Second level</a:t>
+            </a:r>
+          </a:p>
+          <a:p>
+            <a:pPr lvl="2"/>
+            <a:r>
+              <a:rPr lang="en-US" smtClean="0"/>
+              <a:t>Third level</a:t>
+            </a:r>
+          </a:p>
+          <a:p>
+            <a:pPr lvl="3"/>
+            <a:r>
+              <a:rPr lang="en-US" smtClean="0"/>
+              <a:t>Fourth level</a:t>
+            </a:r>
+          </a:p>
+          <a:p>
+            <a:pPr lvl="4"/>
+            <a:r>
+              <a:rPr lang="en-US" smtClean="0"/>
+              <a:t>Fifth level</a:t>
+            </a:r>
+            <a:endParaRPr lang="en-US"/>
+          </a:p>
+        </p:txBody>
+      </p:sp>
+      <p:sp>
+        <p:nvSpPr>
+          <p:cNvPr id="5" name="Slide Number Placeholder 4"/>
+          <p:cNvSpPr>
+            <a:spLocks noGrp="1"/>
+          </p:cNvSpPr>
+          <p:nvPr>
+            <p:ph type="sldNum" sz="quarter" idx="10"/>
+          </p:nvPr>
+        </p:nvSpPr>
+        <p:spPr>
+          <a:xfrm>
+            <a:off x="7848600" y="6553200"/>
+            <a:ext cx="1295400" cy="304800"/>
+          </a:xfrm>
+          <a:prstGeom prst="rect">
+            <a:avLst/>
+          </a:prstGeom>
+        </p:spPr>
+        <p:txBody>
+          <a:bodyPr/>
+          <a:lstStyle>
+            <a:lvl1pPr>
+              <a:defRPr smtClean="0"/>
+            </a:lvl1pPr>
+          </a:lstStyle>
+          <a:p>
+            <a:r>
+              <a:rPr lang="en-US"/>
+              <a:t>lec 14M.</a:t>
+            </a:r>
+            <a:fld id="{6C850064-62E3-1E4A-9434-E4F3C9C45EDA}" type="slidenum">
+              <a:rPr lang="en-US"/>
+              <a:pPr/>
+              <a:t>‹#›</a:t>
+            </a:fld>
+            <a:endParaRPr lang="en-US"/>
+          </a:p>
+        </p:txBody>
+      </p:sp>
+    </p:spTree>
+  </p:cSld>
+  <p:clrMapOvr>
+    <a:masterClrMapping/>
+  </p:clrMapOvr>
+</p:sldLayout>
+</file>
+
+<file path=ppt/slideLayouts/slideLayout7.xml><?xml version="1.0" encoding="utf-8"?>
 <p:sldLayout xmlns:a="http://schemas.openxmlformats.org/drawingml/2006/main" xmlns:r="http://schemas.openxmlformats.org/officeDocument/2006/relationships" xmlns:mc="http://schemas.openxmlformats.org/markup-compatibility/2006" xmlns:mv="urn:schemas-microsoft-com:mac:vml" xmlns:p="http://schemas.openxmlformats.org/presentationml/2006/main" mc:Ignorable="mv" mc:PreserveAttributes="mv:*" type="blank">
   <p:cSld name="Blank">
     <p:spTree>
@@ -7514,7 +7773,7 @@
           <p:nvPr/>
         </p:nvPicPr>
         <p:blipFill>
-          <a:blip r:embed="rId7" cstate="print"/>
+          <a:blip r:embed="rId8" cstate="print"/>
           <a:srcRect/>
           <a:stretch>
             <a:fillRect/>
@@ -7681,7 +7940,7 @@
           <p:nvPr userDrawn="1"/>
         </p:nvPicPr>
         <p:blipFill>
-          <a:blip r:embed="rId8" cstate="print"/>
+          <a:blip r:embed="rId9" cstate="print"/>
           <a:stretch>
             <a:fillRect/>
           </a:stretch>
@@ -7705,6 +7964,7 @@
     <p:sldLayoutId id="2147483680" r:id="rId3"/>
     <p:sldLayoutId id="2147483681" r:id="rId4"/>
     <p:sldLayoutId id="2147483686" r:id="rId5"/>
+    <p:sldLayoutId id="2147483689" r:id="rId6"/>
   </p:sldLayoutIdLst>
   <p:timing>
     <p:tnLst>
@@ -33177,6 +33437,244 @@
       </p:grpSpPr>
       <p:sp>
         <p:nvSpPr>
+          <p:cNvPr id="319490" name="Rectangle 2"/>
+          <p:cNvSpPr>
+            <a:spLocks noGrp="1" noChangeArrowheads="1"/>
+          </p:cNvSpPr>
+          <p:nvPr>
+            <p:ph type="title"/>
+          </p:nvPr>
+        </p:nvSpPr>
+        <p:spPr>
+          <a:xfrm>
+            <a:off x="1447799" y="304800"/>
+            <a:ext cx="7522341" cy="1076124"/>
+          </a:xfrm>
+        </p:spPr>
+        <p:txBody>
+          <a:bodyPr/>
+          <a:lstStyle/>
+          <a:p>
+            <a:r>
+              <a:rPr lang="en-US" b="1" dirty="0"/>
+              <a:t>Jacob D. Bernoulli (1659 – 1705)</a:t>
+            </a:r>
+          </a:p>
+        </p:txBody>
+      </p:sp>
+      <p:sp>
+        <p:nvSpPr>
+          <p:cNvPr id="319491" name="Text Box 3"/>
+          <p:cNvSpPr txBox="1">
+            <a:spLocks noChangeArrowheads="1"/>
+          </p:cNvSpPr>
+          <p:nvPr/>
+        </p:nvSpPr>
+        <p:spPr bwMode="auto">
+          <a:xfrm>
+            <a:off x="1660525" y="3038475"/>
+            <a:ext cx="184150" cy="519113"/>
+          </a:xfrm>
+          <a:prstGeom prst="rect">
+            <a:avLst/>
+          </a:prstGeom>
+          <a:noFill/>
+          <a:ln w="9525">
+            <a:noFill/>
+            <a:miter lim="800000"/>
+            <a:headEnd/>
+            <a:tailEnd/>
+          </a:ln>
+          <a:effectLst/>
+        </p:spPr>
+        <p:txBody>
+          <a:bodyPr wrap="none">
+            <a:prstTxWarp prst="textNoShape">
+              <a:avLst/>
+            </a:prstTxWarp>
+            <a:spAutoFit/>
+          </a:bodyPr>
+          <a:lstStyle/>
+          <a:p>
+            <a:pPr algn="l"/>
+            <a:endParaRPr lang="en-US" sz="2800" i="1"/>
+          </a:p>
+        </p:txBody>
+      </p:sp>
+      <p:sp>
+        <p:nvSpPr>
+          <p:cNvPr id="319492" name="Text Box 4"/>
+          <p:cNvSpPr txBox="1">
+            <a:spLocks noChangeArrowheads="1"/>
+          </p:cNvSpPr>
+          <p:nvPr/>
+        </p:nvSpPr>
+        <p:spPr bwMode="auto">
+          <a:xfrm>
+            <a:off x="457200" y="1295400"/>
+            <a:ext cx="8229600" cy="4968875"/>
+          </a:xfrm>
+          <a:prstGeom prst="rect">
+            <a:avLst/>
+          </a:prstGeom>
+          <a:noFill/>
+          <a:ln w="9525">
+            <a:noFill/>
+            <a:miter lim="800000"/>
+            <a:headEnd/>
+            <a:tailEnd/>
+          </a:ln>
+          <a:effectLst/>
+        </p:spPr>
+        <p:txBody>
+          <a:bodyPr>
+            <a:prstTxWarp prst="textNoShape">
+              <a:avLst/>
+            </a:prstTxWarp>
+            <a:spAutoFit/>
+          </a:bodyPr>
+          <a:lstStyle/>
+          <a:p>
+            <a:pPr algn="l"/>
+            <a:r>
+              <a:rPr lang="en-US" sz="4000" dirty="0">
+                <a:latin typeface="Times New Roman"/>
+                <a:cs typeface="Times New Roman"/>
+              </a:rPr>
+              <a:t>Therefore, this is the problem which I now set forth and make known after I have pondered over it for </a:t>
+            </a:r>
+            <a:r>
+              <a:rPr lang="en-US" sz="4000" dirty="0">
+                <a:solidFill>
+                  <a:srgbClr val="0000FF"/>
+                </a:solidFill>
+                <a:latin typeface="Times New Roman"/>
+                <a:cs typeface="Times New Roman"/>
+              </a:rPr>
+              <a:t>twenty years</a:t>
+            </a:r>
+            <a:r>
+              <a:rPr lang="en-US" sz="4000" dirty="0">
+                <a:latin typeface="Times New Roman"/>
+                <a:cs typeface="Times New Roman"/>
+              </a:rPr>
+              <a:t>.  Both its </a:t>
+            </a:r>
+            <a:r>
+              <a:rPr lang="en-US" sz="4000" dirty="0">
+                <a:solidFill>
+                  <a:srgbClr val="0000FF"/>
+                </a:solidFill>
+                <a:latin typeface="Times New Roman"/>
+                <a:cs typeface="Times New Roman"/>
+              </a:rPr>
+              <a:t>novelty</a:t>
+            </a:r>
+            <a:r>
+              <a:rPr lang="en-US" sz="4000" dirty="0">
+                <a:latin typeface="Times New Roman"/>
+                <a:cs typeface="Times New Roman"/>
+              </a:rPr>
+              <a:t> and its very </a:t>
+            </a:r>
+            <a:r>
+              <a:rPr lang="en-US" sz="4000" dirty="0">
+                <a:solidFill>
+                  <a:srgbClr val="008000"/>
+                </a:solidFill>
+                <a:latin typeface="Times New Roman"/>
+                <a:cs typeface="Times New Roman"/>
+              </a:rPr>
+              <a:t>great</a:t>
+            </a:r>
+            <a:r>
+              <a:rPr lang="en-US" sz="4000" dirty="0">
+                <a:latin typeface="Times New Roman"/>
+                <a:cs typeface="Times New Roman"/>
+              </a:rPr>
+              <a:t> </a:t>
+            </a:r>
+            <a:r>
+              <a:rPr lang="en-US" sz="4000" dirty="0">
+                <a:solidFill>
+                  <a:srgbClr val="008000"/>
+                </a:solidFill>
+                <a:latin typeface="Times New Roman"/>
+                <a:cs typeface="Times New Roman"/>
+              </a:rPr>
+              <a:t>usefulness</a:t>
+            </a:r>
+            <a:r>
+              <a:rPr lang="en-US" sz="4000" dirty="0">
+                <a:latin typeface="Times New Roman"/>
+                <a:cs typeface="Times New Roman"/>
+              </a:rPr>
+              <a:t>, coupled with its just as </a:t>
+            </a:r>
+            <a:r>
+              <a:rPr lang="en-US" sz="4000" dirty="0">
+                <a:solidFill>
+                  <a:schemeClr val="accent2"/>
+                </a:solidFill>
+                <a:latin typeface="Times New Roman"/>
+                <a:cs typeface="Times New Roman"/>
+              </a:rPr>
+              <a:t>great difficulty</a:t>
+            </a:r>
+            <a:r>
+              <a:rPr lang="en-US" sz="4000" dirty="0">
+                <a:latin typeface="Times New Roman"/>
+                <a:cs typeface="Times New Roman"/>
+              </a:rPr>
+              <a:t>, can exceed in</a:t>
+            </a:r>
+          </a:p>
+          <a:p>
+            <a:pPr algn="l"/>
+            <a:r>
+              <a:rPr lang="en-US" sz="4000" dirty="0">
+                <a:latin typeface="Times New Roman"/>
+                <a:cs typeface="Times New Roman"/>
+              </a:rPr>
+              <a:t>weight and value all the remaining chapters of this thesis.</a:t>
+            </a:r>
+          </a:p>
+        </p:txBody>
+      </p:sp>
+    </p:spTree>
+  </p:cSld>
+  <p:clrMapOvr>
+    <a:masterClrMapping/>
+  </p:clrMapOvr>
+  <p:timing>
+    <p:tnLst>
+      <p:par>
+        <p:cTn id="1" dur="indefinite" restart="never" nodeType="tmRoot"/>
+      </p:par>
+    </p:tnLst>
+  </p:timing>
+</p:sld>
+</file>
+
+<file path=ppt/slides/slide59.xml><?xml version="1.0" encoding="utf-8"?>
+<p:sld xmlns:a="http://schemas.openxmlformats.org/drawingml/2006/main" xmlns:r="http://schemas.openxmlformats.org/officeDocument/2006/relationships" xmlns:mc="http://schemas.openxmlformats.org/markup-compatibility/2006" xmlns:mv="urn:schemas-microsoft-com:mac:vml" xmlns:p="http://schemas.openxmlformats.org/presentationml/2006/main" mc:Ignorable="mv" mc:PreserveAttributes="mv:*">
+  <p:cSld>
+    <p:spTree>
+      <p:nvGrpSpPr>
+        <p:cNvPr id="1" name=""/>
+        <p:cNvGrpSpPr/>
+        <p:nvPr/>
+      </p:nvGrpSpPr>
+      <p:grpSpPr>
+        <a:xfrm>
+          <a:off x="0" y="0"/>
+          <a:ext cx="0" cy="0"/>
+          <a:chOff x="0" y="0"/>
+          <a:chExt cx="0" cy="0"/>
+        </a:xfrm>
+      </p:grpSpPr>
+      <p:sp>
+        <p:nvSpPr>
           <p:cNvPr id="324617" name="Text Box 9"/>
           <p:cNvSpPr txBox="1">
             <a:spLocks noChangeArrowheads="1"/>
@@ -33429,398 +33927,6 @@
     <p:bldLst>
       <p:bldP spid="8" grpId="0"/>
     </p:bldLst>
-  </p:timing>
-</p:sld>
-</file>
-
-<file path=ppt/slides/slide59.xml><?xml version="1.0" encoding="utf-8"?>
-<p:sld xmlns:a="http://schemas.openxmlformats.org/drawingml/2006/main" xmlns:r="http://schemas.openxmlformats.org/officeDocument/2006/relationships" xmlns:mc="http://schemas.openxmlformats.org/markup-compatibility/2006" xmlns:mv="urn:schemas-microsoft-com:mac:vml" xmlns:p="http://schemas.openxmlformats.org/presentationml/2006/main" mc:Ignorable="mv" mc:PreserveAttributes="mv:*" showMasterPhAnim="0">
-  <p:cSld>
-    <p:spTree>
-      <p:nvGrpSpPr>
-        <p:cNvPr id="1" name=""/>
-        <p:cNvGrpSpPr/>
-        <p:nvPr/>
-      </p:nvGrpSpPr>
-      <p:grpSpPr>
-        <a:xfrm>
-          <a:off x="0" y="0"/>
-          <a:ext cx="0" cy="0"/>
-          <a:chOff x="0" y="0"/>
-          <a:chExt cx="0" cy="0"/>
-        </a:xfrm>
-      </p:grpSpPr>
-      <p:graphicFrame>
-        <p:nvGraphicFramePr>
-          <p:cNvPr id="11" name="Object 10"/>
-          <p:cNvGraphicFramePr>
-            <a:graphicFrameLocks noChangeAspect="1"/>
-          </p:cNvGraphicFramePr>
-          <p:nvPr/>
-        </p:nvGraphicFramePr>
-        <p:xfrm>
-          <a:off x="2978972" y="3741738"/>
-          <a:ext cx="2768600" cy="1931987"/>
-        </p:xfrm>
-        <a:graphic>
-          <a:graphicData uri="http://schemas.openxmlformats.org/presentationml/2006/ole">
-            <p:oleObj spid="_x0000_s146436" name="Equation" r:id="rId4" imgW="673100" imgH="469900" progId="Equation.DSMT4">
-              <p:embed/>
-            </p:oleObj>
-          </a:graphicData>
-        </a:graphic>
-      </p:graphicFrame>
-      <p:graphicFrame>
-        <p:nvGraphicFramePr>
-          <p:cNvPr id="7" name="Object 6"/>
-          <p:cNvGraphicFramePr>
-            <a:graphicFrameLocks noChangeAspect="1"/>
-          </p:cNvGraphicFramePr>
-          <p:nvPr/>
-        </p:nvGraphicFramePr>
-        <p:xfrm>
-          <a:off x="1214199" y="1173418"/>
-          <a:ext cx="6702981" cy="1729801"/>
-        </p:xfrm>
-        <a:graphic>
-          <a:graphicData uri="http://schemas.openxmlformats.org/presentationml/2006/ole">
-            <p:oleObj spid="_x0000_s146434" name="Equation" r:id="rId5" imgW="1968480" imgH="507960" progId="Equation.DSMT4">
-              <p:embed/>
-            </p:oleObj>
-          </a:graphicData>
-        </a:graphic>
-      </p:graphicFrame>
-      <p:grpSp>
-        <p:nvGrpSpPr>
-          <p:cNvPr id="10" name="Group 9"/>
-          <p:cNvGrpSpPr/>
-          <p:nvPr/>
-        </p:nvGrpSpPr>
-        <p:grpSpPr>
-          <a:xfrm>
-            <a:off x="1114669" y="1446784"/>
-            <a:ext cx="4686806" cy="3741420"/>
-            <a:chOff x="1114669" y="1446784"/>
-            <a:chExt cx="4686806" cy="3741420"/>
-          </a:xfrm>
-        </p:grpSpPr>
-        <p:sp>
-          <p:nvSpPr>
-            <p:cNvPr id="32778" name="Rectangle 10"/>
-            <p:cNvSpPr>
-              <a:spLocks noChangeArrowheads="1"/>
-            </p:cNvSpPr>
-            <p:nvPr/>
-          </p:nvSpPr>
-          <p:spPr bwMode="auto">
-            <a:xfrm>
-              <a:off x="1114669" y="1446784"/>
-              <a:ext cx="1584960" cy="1226820"/>
-            </a:xfrm>
-            <a:prstGeom prst="rect">
-              <a:avLst/>
-            </a:prstGeom>
-            <a:noFill/>
-            <a:ln w="38100">
-              <a:solidFill>
-                <a:srgbClr val="FF00FF"/>
-              </a:solidFill>
-              <a:prstDash val="sysDash"/>
-              <a:miter lim="800000"/>
-              <a:headEnd/>
-              <a:tailEnd/>
-            </a:ln>
-            <a:effectLst/>
-          </p:spPr>
-          <p:txBody>
-            <a:bodyPr wrap="none" anchor="ctr"/>
-            <a:lstStyle/>
-            <a:p>
-              <a:endParaRPr lang="en-US"/>
-            </a:p>
-          </p:txBody>
-        </p:sp>
-        <p:sp>
-          <p:nvSpPr>
-            <p:cNvPr id="32779" name="Rectangle 11"/>
-            <p:cNvSpPr>
-              <a:spLocks noChangeArrowheads="1"/>
-            </p:cNvSpPr>
-            <p:nvPr/>
-          </p:nvSpPr>
-          <p:spPr bwMode="auto">
-            <a:xfrm>
-              <a:off x="4610100" y="4416581"/>
-              <a:ext cx="1191375" cy="771623"/>
-            </a:xfrm>
-            <a:prstGeom prst="rect">
-              <a:avLst/>
-            </a:prstGeom>
-            <a:noFill/>
-            <a:ln w="38100">
-              <a:solidFill>
-                <a:srgbClr val="FF00FF"/>
-              </a:solidFill>
-              <a:prstDash val="sysDash"/>
-              <a:miter lim="800000"/>
-              <a:headEnd/>
-              <a:tailEnd/>
-            </a:ln>
-            <a:effectLst/>
-          </p:spPr>
-          <p:txBody>
-            <a:bodyPr wrap="none" anchor="ctr"/>
-            <a:lstStyle/>
-            <a:p>
-              <a:endParaRPr lang="en-US"/>
-            </a:p>
-          </p:txBody>
-        </p:sp>
-      </p:grpSp>
-      <p:sp>
-        <p:nvSpPr>
-          <p:cNvPr id="32773" name="Rectangle 16"/>
-          <p:cNvSpPr>
-            <a:spLocks noGrp="1" noChangeArrowheads="1"/>
-          </p:cNvSpPr>
-          <p:nvPr>
-            <p:ph type="title" idx="4294967295"/>
-          </p:nvPr>
-        </p:nvSpPr>
-        <p:spPr>
-          <a:xfrm>
-            <a:off x="2133600" y="228600"/>
-            <a:ext cx="4724400" cy="1219200"/>
-          </a:xfrm>
-          <a:noFill/>
-        </p:spPr>
-        <p:txBody>
-          <a:bodyPr/>
-          <a:lstStyle/>
-          <a:p>
-            <a:r>
-              <a:rPr lang="en-US" sz="4400" dirty="0"/>
-              <a:t>Repeated Trials</a:t>
-            </a:r>
-          </a:p>
-        </p:txBody>
-      </p:sp>
-      <p:graphicFrame>
-        <p:nvGraphicFramePr>
-          <p:cNvPr id="8" name="Object 7"/>
-          <p:cNvGraphicFramePr>
-            <a:graphicFrameLocks noChangeAspect="1"/>
-          </p:cNvGraphicFramePr>
-          <p:nvPr/>
-        </p:nvGraphicFramePr>
-        <p:xfrm>
-          <a:off x="3007355" y="2930524"/>
-          <a:ext cx="5696483" cy="1367156"/>
-        </p:xfrm>
-        <a:graphic>
-          <a:graphicData uri="http://schemas.openxmlformats.org/presentationml/2006/ole">
-            <p:oleObj spid="_x0000_s146435" name="Equation" r:id="rId6" imgW="1904760" imgH="457200" progId="Equation.DSMT4">
-              <p:embed/>
-            </p:oleObj>
-          </a:graphicData>
-        </a:graphic>
-      </p:graphicFrame>
-    </p:spTree>
-  </p:cSld>
-  <p:clrMapOvr>
-    <a:masterClrMapping/>
-  </p:clrMapOvr>
-  <p:transition>
-    <p:fade/>
-  </p:transition>
-  <p:timing>
-    <p:tnLst>
-      <p:par>
-        <p:cTn id="1" dur="indefinite" restart="never" nodeType="tmRoot">
-          <p:childTnLst>
-            <p:seq concurrent="1" nextAc="seek">
-              <p:cTn id="2" dur="indefinite" nodeType="mainSeq">
-                <p:childTnLst>
-                  <p:par>
-                    <p:cTn id="3" fill="hold">
-                      <p:stCondLst>
-                        <p:cond delay="indefinite"/>
-                      </p:stCondLst>
-                      <p:childTnLst>
-                        <p:par>
-                          <p:cTn id="4" fill="hold">
-                            <p:stCondLst>
-                              <p:cond delay="0"/>
-                            </p:stCondLst>
-                            <p:childTnLst>
-                              <p:par>
-                                <p:cTn id="5" presetID="22" presetClass="entr" presetSubtype="8" fill="hold" nodeType="clickEffect">
-                                  <p:stCondLst>
-                                    <p:cond delay="0"/>
-                                  </p:stCondLst>
-                                  <p:childTnLst>
-                                    <p:set>
-                                      <p:cBhvr>
-                                        <p:cTn id="6" dur="1" fill="hold">
-                                          <p:stCondLst>
-                                            <p:cond delay="0"/>
-                                          </p:stCondLst>
-                                        </p:cTn>
-                                        <p:tgtEl>
-                                          <p:spTgt spid="8"/>
-                                        </p:tgtEl>
-                                        <p:attrNameLst>
-                                          <p:attrName>style.visibility</p:attrName>
-                                        </p:attrNameLst>
-                                      </p:cBhvr>
-                                      <p:to>
-                                        <p:strVal val="visible"/>
-                                      </p:to>
-                                    </p:set>
-                                    <p:animEffect transition="in" filter="wipe(left)">
-                                      <p:cBhvr>
-                                        <p:cTn id="7" dur="500"/>
-                                        <p:tgtEl>
-                                          <p:spTgt spid="8"/>
-                                        </p:tgtEl>
-                                      </p:cBhvr>
-                                    </p:animEffect>
-                                  </p:childTnLst>
-                                </p:cTn>
-                              </p:par>
-                            </p:childTnLst>
-                          </p:cTn>
-                        </p:par>
-                      </p:childTnLst>
-                    </p:cTn>
-                  </p:par>
-                  <p:par>
-                    <p:cTn id="8" fill="hold">
-                      <p:stCondLst>
-                        <p:cond delay="indefinite"/>
-                      </p:stCondLst>
-                      <p:childTnLst>
-                        <p:par>
-                          <p:cTn id="9" fill="hold">
-                            <p:stCondLst>
-                              <p:cond delay="0"/>
-                            </p:stCondLst>
-                            <p:childTnLst>
-                              <p:par>
-                                <p:cTn id="10" presetID="22" presetClass="entr" presetSubtype="8" fill="hold" nodeType="clickEffect">
-                                  <p:stCondLst>
-                                    <p:cond delay="0"/>
-                                  </p:stCondLst>
-                                  <p:childTnLst>
-                                    <p:set>
-                                      <p:cBhvr>
-                                        <p:cTn id="11" dur="1" fill="hold">
-                                          <p:stCondLst>
-                                            <p:cond delay="0"/>
-                                          </p:stCondLst>
-                                        </p:cTn>
-                                        <p:tgtEl>
-                                          <p:spTgt spid="11"/>
-                                        </p:tgtEl>
-                                        <p:attrNameLst>
-                                          <p:attrName>style.visibility</p:attrName>
-                                        </p:attrNameLst>
-                                      </p:cBhvr>
-                                      <p:to>
-                                        <p:strVal val="visible"/>
-                                      </p:to>
-                                    </p:set>
-                                    <p:animEffect transition="in" filter="wipe(left)">
-                                      <p:cBhvr>
-                                        <p:cTn id="12" dur="500"/>
-                                        <p:tgtEl>
-                                          <p:spTgt spid="11"/>
-                                        </p:tgtEl>
-                                      </p:cBhvr>
-                                    </p:animEffect>
-                                  </p:childTnLst>
-                                </p:cTn>
-                              </p:par>
-                            </p:childTnLst>
-                          </p:cTn>
-                        </p:par>
-                      </p:childTnLst>
-                    </p:cTn>
-                  </p:par>
-                  <p:par>
-                    <p:cTn id="13" fill="hold">
-                      <p:stCondLst>
-                        <p:cond delay="indefinite"/>
-                      </p:stCondLst>
-                      <p:childTnLst>
-                        <p:par>
-                          <p:cTn id="14" fill="hold">
-                            <p:stCondLst>
-                              <p:cond delay="0"/>
-                            </p:stCondLst>
-                            <p:childTnLst>
-                              <p:par>
-                                <p:cTn id="15" presetID="10" presetClass="entr" presetSubtype="0" fill="hold" nodeType="clickEffect">
-                                  <p:stCondLst>
-                                    <p:cond delay="0"/>
-                                  </p:stCondLst>
-                                  <p:childTnLst>
-                                    <p:set>
-                                      <p:cBhvr>
-                                        <p:cTn id="16" dur="1" fill="hold">
-                                          <p:stCondLst>
-                                            <p:cond delay="0"/>
-                                          </p:stCondLst>
-                                        </p:cTn>
-                                        <p:tgtEl>
-                                          <p:spTgt spid="10"/>
-                                        </p:tgtEl>
-                                        <p:attrNameLst>
-                                          <p:attrName>style.visibility</p:attrName>
-                                        </p:attrNameLst>
-                                      </p:cBhvr>
-                                      <p:to>
-                                        <p:strVal val="visible"/>
-                                      </p:to>
-                                    </p:set>
-                                    <p:animEffect transition="in" filter="fade">
-                                      <p:cBhvr>
-                                        <p:cTn id="17" dur="500"/>
-                                        <p:tgtEl>
-                                          <p:spTgt spid="10"/>
-                                        </p:tgtEl>
-                                      </p:cBhvr>
-                                    </p:animEffect>
-                                  </p:childTnLst>
-                                </p:cTn>
-                              </p:par>
-                            </p:childTnLst>
-                          </p:cTn>
-                        </p:par>
-                      </p:childTnLst>
-                    </p:cTn>
-                  </p:par>
-                </p:childTnLst>
-              </p:cTn>
-              <p:prevCondLst>
-                <p:cond evt="onPrev" delay="0">
-                  <p:tgtEl>
-                    <p:sldTgt/>
-                  </p:tgtEl>
-                </p:cond>
-              </p:prevCondLst>
-              <p:nextCondLst>
-                <p:cond evt="onNext" delay="0">
-                  <p:tgtEl>
-                    <p:sldTgt/>
-                  </p:tgtEl>
-                </p:cond>
-              </p:nextCondLst>
-            </p:seq>
-          </p:childTnLst>
-        </p:cTn>
-      </p:par>
-    </p:tnLst>
   </p:timing>
 </p:sld>
 </file>
@@ -34609,6 +34715,398 @@
 </file>
 
 <file path=ppt/slides/slide60.xml><?xml version="1.0" encoding="utf-8"?>
+<p:sld xmlns:a="http://schemas.openxmlformats.org/drawingml/2006/main" xmlns:r="http://schemas.openxmlformats.org/officeDocument/2006/relationships" xmlns:mc="http://schemas.openxmlformats.org/markup-compatibility/2006" xmlns:mv="urn:schemas-microsoft-com:mac:vml" xmlns:p="http://schemas.openxmlformats.org/presentationml/2006/main" mc:Ignorable="mv" mc:PreserveAttributes="mv:*" showMasterPhAnim="0">
+  <p:cSld>
+    <p:spTree>
+      <p:nvGrpSpPr>
+        <p:cNvPr id="1" name=""/>
+        <p:cNvGrpSpPr/>
+        <p:nvPr/>
+      </p:nvGrpSpPr>
+      <p:grpSpPr>
+        <a:xfrm>
+          <a:off x="0" y="0"/>
+          <a:ext cx="0" cy="0"/>
+          <a:chOff x="0" y="0"/>
+          <a:chExt cx="0" cy="0"/>
+        </a:xfrm>
+      </p:grpSpPr>
+      <p:graphicFrame>
+        <p:nvGraphicFramePr>
+          <p:cNvPr id="11" name="Object 10"/>
+          <p:cNvGraphicFramePr>
+            <a:graphicFrameLocks noChangeAspect="1"/>
+          </p:cNvGraphicFramePr>
+          <p:nvPr/>
+        </p:nvGraphicFramePr>
+        <p:xfrm>
+          <a:off x="2978972" y="3741738"/>
+          <a:ext cx="2768600" cy="1931987"/>
+        </p:xfrm>
+        <a:graphic>
+          <a:graphicData uri="http://schemas.openxmlformats.org/presentationml/2006/ole">
+            <p:oleObj spid="_x0000_s146436" name="Equation" r:id="rId4" imgW="673100" imgH="469900" progId="Equation.DSMT4">
+              <p:embed/>
+            </p:oleObj>
+          </a:graphicData>
+        </a:graphic>
+      </p:graphicFrame>
+      <p:graphicFrame>
+        <p:nvGraphicFramePr>
+          <p:cNvPr id="7" name="Object 6"/>
+          <p:cNvGraphicFramePr>
+            <a:graphicFrameLocks noChangeAspect="1"/>
+          </p:cNvGraphicFramePr>
+          <p:nvPr/>
+        </p:nvGraphicFramePr>
+        <p:xfrm>
+          <a:off x="1214199" y="1173418"/>
+          <a:ext cx="6702981" cy="1729801"/>
+        </p:xfrm>
+        <a:graphic>
+          <a:graphicData uri="http://schemas.openxmlformats.org/presentationml/2006/ole">
+            <p:oleObj spid="_x0000_s146434" name="Equation" r:id="rId5" imgW="1968480" imgH="507960" progId="Equation.DSMT4">
+              <p:embed/>
+            </p:oleObj>
+          </a:graphicData>
+        </a:graphic>
+      </p:graphicFrame>
+      <p:grpSp>
+        <p:nvGrpSpPr>
+          <p:cNvPr id="10" name="Group 9"/>
+          <p:cNvGrpSpPr/>
+          <p:nvPr/>
+        </p:nvGrpSpPr>
+        <p:grpSpPr>
+          <a:xfrm>
+            <a:off x="1114669" y="1446784"/>
+            <a:ext cx="4686806" cy="3741420"/>
+            <a:chOff x="1114669" y="1446784"/>
+            <a:chExt cx="4686806" cy="3741420"/>
+          </a:xfrm>
+        </p:grpSpPr>
+        <p:sp>
+          <p:nvSpPr>
+            <p:cNvPr id="32778" name="Rectangle 10"/>
+            <p:cNvSpPr>
+              <a:spLocks noChangeArrowheads="1"/>
+            </p:cNvSpPr>
+            <p:nvPr/>
+          </p:nvSpPr>
+          <p:spPr bwMode="auto">
+            <a:xfrm>
+              <a:off x="1114669" y="1446784"/>
+              <a:ext cx="1584960" cy="1226820"/>
+            </a:xfrm>
+            <a:prstGeom prst="rect">
+              <a:avLst/>
+            </a:prstGeom>
+            <a:noFill/>
+            <a:ln w="38100">
+              <a:solidFill>
+                <a:srgbClr val="FF00FF"/>
+              </a:solidFill>
+              <a:prstDash val="sysDash"/>
+              <a:miter lim="800000"/>
+              <a:headEnd/>
+              <a:tailEnd/>
+            </a:ln>
+            <a:effectLst/>
+          </p:spPr>
+          <p:txBody>
+            <a:bodyPr wrap="none" anchor="ctr"/>
+            <a:lstStyle/>
+            <a:p>
+              <a:endParaRPr lang="en-US"/>
+            </a:p>
+          </p:txBody>
+        </p:sp>
+        <p:sp>
+          <p:nvSpPr>
+            <p:cNvPr id="32779" name="Rectangle 11"/>
+            <p:cNvSpPr>
+              <a:spLocks noChangeArrowheads="1"/>
+            </p:cNvSpPr>
+            <p:nvPr/>
+          </p:nvSpPr>
+          <p:spPr bwMode="auto">
+            <a:xfrm>
+              <a:off x="4610100" y="4416581"/>
+              <a:ext cx="1191375" cy="771623"/>
+            </a:xfrm>
+            <a:prstGeom prst="rect">
+              <a:avLst/>
+            </a:prstGeom>
+            <a:noFill/>
+            <a:ln w="38100">
+              <a:solidFill>
+                <a:srgbClr val="FF00FF"/>
+              </a:solidFill>
+              <a:prstDash val="sysDash"/>
+              <a:miter lim="800000"/>
+              <a:headEnd/>
+              <a:tailEnd/>
+            </a:ln>
+            <a:effectLst/>
+          </p:spPr>
+          <p:txBody>
+            <a:bodyPr wrap="none" anchor="ctr"/>
+            <a:lstStyle/>
+            <a:p>
+              <a:endParaRPr lang="en-US"/>
+            </a:p>
+          </p:txBody>
+        </p:sp>
+      </p:grpSp>
+      <p:sp>
+        <p:nvSpPr>
+          <p:cNvPr id="32773" name="Rectangle 16"/>
+          <p:cNvSpPr>
+            <a:spLocks noGrp="1" noChangeArrowheads="1"/>
+          </p:cNvSpPr>
+          <p:nvPr>
+            <p:ph type="title" idx="4294967295"/>
+          </p:nvPr>
+        </p:nvSpPr>
+        <p:spPr>
+          <a:xfrm>
+            <a:off x="2133600" y="228600"/>
+            <a:ext cx="4724400" cy="1219200"/>
+          </a:xfrm>
+          <a:noFill/>
+        </p:spPr>
+        <p:txBody>
+          <a:bodyPr/>
+          <a:lstStyle/>
+          <a:p>
+            <a:r>
+              <a:rPr lang="en-US" sz="4400" dirty="0"/>
+              <a:t>Repeated Trials</a:t>
+            </a:r>
+          </a:p>
+        </p:txBody>
+      </p:sp>
+      <p:graphicFrame>
+        <p:nvGraphicFramePr>
+          <p:cNvPr id="8" name="Object 7"/>
+          <p:cNvGraphicFramePr>
+            <a:graphicFrameLocks noChangeAspect="1"/>
+          </p:cNvGraphicFramePr>
+          <p:nvPr/>
+        </p:nvGraphicFramePr>
+        <p:xfrm>
+          <a:off x="3007355" y="2930524"/>
+          <a:ext cx="5696483" cy="1367156"/>
+        </p:xfrm>
+        <a:graphic>
+          <a:graphicData uri="http://schemas.openxmlformats.org/presentationml/2006/ole">
+            <p:oleObj spid="_x0000_s146435" name="Equation" r:id="rId6" imgW="1904760" imgH="457200" progId="Equation.DSMT4">
+              <p:embed/>
+            </p:oleObj>
+          </a:graphicData>
+        </a:graphic>
+      </p:graphicFrame>
+    </p:spTree>
+  </p:cSld>
+  <p:clrMapOvr>
+    <a:masterClrMapping/>
+  </p:clrMapOvr>
+  <p:transition>
+    <p:fade/>
+  </p:transition>
+  <p:timing>
+    <p:tnLst>
+      <p:par>
+        <p:cTn id="1" dur="indefinite" restart="never" nodeType="tmRoot">
+          <p:childTnLst>
+            <p:seq concurrent="1" nextAc="seek">
+              <p:cTn id="2" dur="indefinite" nodeType="mainSeq">
+                <p:childTnLst>
+                  <p:par>
+                    <p:cTn id="3" fill="hold">
+                      <p:stCondLst>
+                        <p:cond delay="indefinite"/>
+                      </p:stCondLst>
+                      <p:childTnLst>
+                        <p:par>
+                          <p:cTn id="4" fill="hold">
+                            <p:stCondLst>
+                              <p:cond delay="0"/>
+                            </p:stCondLst>
+                            <p:childTnLst>
+                              <p:par>
+                                <p:cTn id="5" presetID="22" presetClass="entr" presetSubtype="8" fill="hold" nodeType="clickEffect">
+                                  <p:stCondLst>
+                                    <p:cond delay="0"/>
+                                  </p:stCondLst>
+                                  <p:childTnLst>
+                                    <p:set>
+                                      <p:cBhvr>
+                                        <p:cTn id="6" dur="1" fill="hold">
+                                          <p:stCondLst>
+                                            <p:cond delay="0"/>
+                                          </p:stCondLst>
+                                        </p:cTn>
+                                        <p:tgtEl>
+                                          <p:spTgt spid="8"/>
+                                        </p:tgtEl>
+                                        <p:attrNameLst>
+                                          <p:attrName>style.visibility</p:attrName>
+                                        </p:attrNameLst>
+                                      </p:cBhvr>
+                                      <p:to>
+                                        <p:strVal val="visible"/>
+                                      </p:to>
+                                    </p:set>
+                                    <p:animEffect transition="in" filter="wipe(left)">
+                                      <p:cBhvr>
+                                        <p:cTn id="7" dur="500"/>
+                                        <p:tgtEl>
+                                          <p:spTgt spid="8"/>
+                                        </p:tgtEl>
+                                      </p:cBhvr>
+                                    </p:animEffect>
+                                  </p:childTnLst>
+                                </p:cTn>
+                              </p:par>
+                            </p:childTnLst>
+                          </p:cTn>
+                        </p:par>
+                      </p:childTnLst>
+                    </p:cTn>
+                  </p:par>
+                  <p:par>
+                    <p:cTn id="8" fill="hold">
+                      <p:stCondLst>
+                        <p:cond delay="indefinite"/>
+                      </p:stCondLst>
+                      <p:childTnLst>
+                        <p:par>
+                          <p:cTn id="9" fill="hold">
+                            <p:stCondLst>
+                              <p:cond delay="0"/>
+                            </p:stCondLst>
+                            <p:childTnLst>
+                              <p:par>
+                                <p:cTn id="10" presetID="22" presetClass="entr" presetSubtype="8" fill="hold" nodeType="clickEffect">
+                                  <p:stCondLst>
+                                    <p:cond delay="0"/>
+                                  </p:stCondLst>
+                                  <p:childTnLst>
+                                    <p:set>
+                                      <p:cBhvr>
+                                        <p:cTn id="11" dur="1" fill="hold">
+                                          <p:stCondLst>
+                                            <p:cond delay="0"/>
+                                          </p:stCondLst>
+                                        </p:cTn>
+                                        <p:tgtEl>
+                                          <p:spTgt spid="11"/>
+                                        </p:tgtEl>
+                                        <p:attrNameLst>
+                                          <p:attrName>style.visibility</p:attrName>
+                                        </p:attrNameLst>
+                                      </p:cBhvr>
+                                      <p:to>
+                                        <p:strVal val="visible"/>
+                                      </p:to>
+                                    </p:set>
+                                    <p:animEffect transition="in" filter="wipe(left)">
+                                      <p:cBhvr>
+                                        <p:cTn id="12" dur="500"/>
+                                        <p:tgtEl>
+                                          <p:spTgt spid="11"/>
+                                        </p:tgtEl>
+                                      </p:cBhvr>
+                                    </p:animEffect>
+                                  </p:childTnLst>
+                                </p:cTn>
+                              </p:par>
+                            </p:childTnLst>
+                          </p:cTn>
+                        </p:par>
+                      </p:childTnLst>
+                    </p:cTn>
+                  </p:par>
+                  <p:par>
+                    <p:cTn id="13" fill="hold">
+                      <p:stCondLst>
+                        <p:cond delay="indefinite"/>
+                      </p:stCondLst>
+                      <p:childTnLst>
+                        <p:par>
+                          <p:cTn id="14" fill="hold">
+                            <p:stCondLst>
+                              <p:cond delay="0"/>
+                            </p:stCondLst>
+                            <p:childTnLst>
+                              <p:par>
+                                <p:cTn id="15" presetID="10" presetClass="entr" presetSubtype="0" fill="hold" nodeType="clickEffect">
+                                  <p:stCondLst>
+                                    <p:cond delay="0"/>
+                                  </p:stCondLst>
+                                  <p:childTnLst>
+                                    <p:set>
+                                      <p:cBhvr>
+                                        <p:cTn id="16" dur="1" fill="hold">
+                                          <p:stCondLst>
+                                            <p:cond delay="0"/>
+                                          </p:stCondLst>
+                                        </p:cTn>
+                                        <p:tgtEl>
+                                          <p:spTgt spid="10"/>
+                                        </p:tgtEl>
+                                        <p:attrNameLst>
+                                          <p:attrName>style.visibility</p:attrName>
+                                        </p:attrNameLst>
+                                      </p:cBhvr>
+                                      <p:to>
+                                        <p:strVal val="visible"/>
+                                      </p:to>
+                                    </p:set>
+                                    <p:animEffect transition="in" filter="fade">
+                                      <p:cBhvr>
+                                        <p:cTn id="17" dur="500"/>
+                                        <p:tgtEl>
+                                          <p:spTgt spid="10"/>
+                                        </p:tgtEl>
+                                      </p:cBhvr>
+                                    </p:animEffect>
+                                  </p:childTnLst>
+                                </p:cTn>
+                              </p:par>
+                            </p:childTnLst>
+                          </p:cTn>
+                        </p:par>
+                      </p:childTnLst>
+                    </p:cTn>
+                  </p:par>
+                </p:childTnLst>
+              </p:cTn>
+              <p:prevCondLst>
+                <p:cond evt="onPrev" delay="0">
+                  <p:tgtEl>
+                    <p:sldTgt/>
+                  </p:tgtEl>
+                </p:cond>
+              </p:prevCondLst>
+              <p:nextCondLst>
+                <p:cond evt="onNext" delay="0">
+                  <p:tgtEl>
+                    <p:sldTgt/>
+                  </p:tgtEl>
+                </p:cond>
+              </p:nextCondLst>
+            </p:seq>
+          </p:childTnLst>
+        </p:cTn>
+      </p:par>
+    </p:tnLst>
+  </p:timing>
+</p:sld>
+</file>
+
+<file path=ppt/slides/slide61.xml><?xml version="1.0" encoding="utf-8"?>
 <p:sld xmlns:a="http://schemas.openxmlformats.org/drawingml/2006/main" xmlns:r="http://schemas.openxmlformats.org/officeDocument/2006/relationships" xmlns:mc="http://schemas.openxmlformats.org/markup-compatibility/2006" xmlns:mv="urn:schemas-microsoft-com:mac:vml" xmlns:p="http://schemas.openxmlformats.org/presentationml/2006/main" mc:Ignorable="mv" mc:PreserveAttributes="mv:*">
   <p:cSld>
     <p:spTree>
@@ -34999,7 +35497,7 @@
 </p:sld>
 </file>
 
-<file path=ppt/slides/slide61.xml><?xml version="1.0" encoding="utf-8"?>
+<file path=ppt/slides/slide62.xml><?xml version="1.0" encoding="utf-8"?>
 <p:sld xmlns:a="http://schemas.openxmlformats.org/drawingml/2006/main" xmlns:r="http://schemas.openxmlformats.org/officeDocument/2006/relationships" xmlns:mc="http://schemas.openxmlformats.org/markup-compatibility/2006" xmlns:mv="urn:schemas-microsoft-com:mac:vml" xmlns:p="http://schemas.openxmlformats.org/presentationml/2006/main" mc:Ignorable="mv" mc:PreserveAttributes="mv:*" show="0">
   <p:cSld>
     <p:spTree>
@@ -35344,7 +35842,7 @@
 </p:sld>
 </file>
 
-<file path=ppt/slides/slide62.xml><?xml version="1.0" encoding="utf-8"?>
+<file path=ppt/slides/slide63.xml><?xml version="1.0" encoding="utf-8"?>
 <p:sld xmlns:a="http://schemas.openxmlformats.org/drawingml/2006/main" xmlns:r="http://schemas.openxmlformats.org/officeDocument/2006/relationships" xmlns:mc="http://schemas.openxmlformats.org/markup-compatibility/2006" xmlns:mv="urn:schemas-microsoft-com:mac:vml" xmlns:p="http://schemas.openxmlformats.org/presentationml/2006/main" mc:Ignorable="mv" mc:PreserveAttributes="mv:*" showMasterPhAnim="0">
   <p:cSld>
     <p:spTree>
@@ -36091,7 +36589,7 @@
 </p:sld>
 </file>
 
-<file path=ppt/slides/slide63.xml><?xml version="1.0" encoding="utf-8"?>
+<file path=ppt/slides/slide64.xml><?xml version="1.0" encoding="utf-8"?>
 <p:sld xmlns:a="http://schemas.openxmlformats.org/drawingml/2006/main" xmlns:r="http://schemas.openxmlformats.org/officeDocument/2006/relationships" xmlns:mc="http://schemas.openxmlformats.org/markup-compatibility/2006" xmlns:mv="urn:schemas-microsoft-com:mac:vml" xmlns:p="http://schemas.openxmlformats.org/presentationml/2006/main" mc:Ignorable="mv" mc:PreserveAttributes="mv:*">
   <p:cSld>
     <p:spTree>
@@ -36703,7 +37201,7 @@
 </p:sld>
 </file>
 
-<file path=ppt/slides/slide64.xml><?xml version="1.0" encoding="utf-8"?>
+<file path=ppt/slides/slide65.xml><?xml version="1.0" encoding="utf-8"?>
 <p:sld xmlns:a="http://schemas.openxmlformats.org/drawingml/2006/main" xmlns:r="http://schemas.openxmlformats.org/officeDocument/2006/relationships" xmlns:mc="http://schemas.openxmlformats.org/markup-compatibility/2006" xmlns:mv="urn:schemas-microsoft-com:mac:vml" xmlns:p="http://schemas.openxmlformats.org/presentationml/2006/main" mc:Ignorable="mv" mc:PreserveAttributes="mv:*">
   <p:cSld>
     <p:spTree>
@@ -37508,7 +38006,7 @@
 </p:sld>
 </file>
 
-<file path=ppt/slides/slide65.xml><?xml version="1.0" encoding="utf-8"?>
+<file path=ppt/slides/slide66.xml><?xml version="1.0" encoding="utf-8"?>
 <p:sld xmlns:a="http://schemas.openxmlformats.org/drawingml/2006/main" xmlns:r="http://schemas.openxmlformats.org/officeDocument/2006/relationships" xmlns:mc="http://schemas.openxmlformats.org/markup-compatibility/2006" xmlns:mv="urn:schemas-microsoft-com:mac:vml" xmlns:p="http://schemas.openxmlformats.org/presentationml/2006/main" mc:Ignorable="mv" mc:PreserveAttributes="mv:*">
   <p:cSld>
     <p:spTree>
@@ -38241,7 +38739,7 @@
 </p:sld>
 </file>
 
-<file path=ppt/slides/slide66.xml><?xml version="1.0" encoding="utf-8"?>
+<file path=ppt/slides/slide67.xml><?xml version="1.0" encoding="utf-8"?>
 <p:sld xmlns:a="http://schemas.openxmlformats.org/drawingml/2006/main" xmlns:r="http://schemas.openxmlformats.org/officeDocument/2006/relationships" xmlns:mc="http://schemas.openxmlformats.org/markup-compatibility/2006" xmlns:mv="urn:schemas-microsoft-com:mac:vml" xmlns:p="http://schemas.openxmlformats.org/presentationml/2006/main" mc:Ignorable="mv" mc:PreserveAttributes="mv:*">
   <p:cSld>
     <p:spTree>

</xml_diff>